<commit_message>
checked and updated d2/s2, needs an exercise
</commit_message>
<xml_diff>
--- a/doc/slides/day2/session2/ProjectOrg.pptx
+++ b/doc/slides/day2/session2/ProjectOrg.pptx
@@ -1,20 +1,19 @@
 
 <file path=ppt/presentation.xml><?xml version="1.0" encoding="utf-8"?>
-<p:presentation xmlns:a="http://schemas.openxmlformats.org/drawingml/2006/main" xmlns:r="http://schemas.openxmlformats.org/officeDocument/2006/relationships" xmlns:mc="http://schemas.openxmlformats.org/markup-compatibility/2006" xmlns:mv="urn:schemas-microsoft-com:mac:vml" xmlns:p="http://schemas.openxmlformats.org/presentationml/2006/main" mc:Ignorable="mv" mc:PreserveAttributes="mv:*" saveSubsetFonts="1" autoCompressPictures="0">
+<p:presentation xmlns:a="http://schemas.openxmlformats.org/drawingml/2006/main" xmlns:r="http://schemas.openxmlformats.org/officeDocument/2006/relationships" xmlns:p="http://schemas.openxmlformats.org/presentationml/2006/main" saveSubsetFonts="1" autoCompressPictures="0">
   <p:sldMasterIdLst>
     <p:sldMasterId id="2147483648" r:id="rId1"/>
   </p:sldMasterIdLst>
   <p:notesMasterIdLst>
-    <p:notesMasterId r:id="rId9"/>
+    <p:notesMasterId r:id="rId8"/>
   </p:notesMasterIdLst>
   <p:sldIdLst>
     <p:sldId id="256" r:id="rId2"/>
     <p:sldId id="257" r:id="rId3"/>
     <p:sldId id="260" r:id="rId4"/>
-    <p:sldId id="258" r:id="rId5"/>
-    <p:sldId id="259" r:id="rId6"/>
-    <p:sldId id="261" r:id="rId7"/>
-    <p:sldId id="262" r:id="rId8"/>
+    <p:sldId id="259" r:id="rId5"/>
+    <p:sldId id="261" r:id="rId6"/>
+    <p:sldId id="262" r:id="rId7"/>
   </p:sldIdLst>
   <p:sldSz cx="9144000" cy="6858000" type="screen4x3"/>
   <p:notesSz cx="6858000" cy="9144000"/>
@@ -117,7 +116,7 @@
 </file>
 
 <file path=ppt/notesMasters/notesMaster1.xml><?xml version="1.0" encoding="utf-8"?>
-<p:notesMaster xmlns:a="http://schemas.openxmlformats.org/drawingml/2006/main" xmlns:r="http://schemas.openxmlformats.org/officeDocument/2006/relationships" xmlns:mc="http://schemas.openxmlformats.org/markup-compatibility/2006" xmlns:mv="urn:schemas-microsoft-com:mac:vml" xmlns:p="http://schemas.openxmlformats.org/presentationml/2006/main" mc:Ignorable="mv" mc:PreserveAttributes="mv:*">
+<p:notesMaster xmlns:a="http://schemas.openxmlformats.org/drawingml/2006/main" xmlns:r="http://schemas.openxmlformats.org/officeDocument/2006/relationships" xmlns:p="http://schemas.openxmlformats.org/presentationml/2006/main">
   <p:cSld>
     <p:bg>
       <p:bgRef idx="1001">
@@ -199,7 +198,7 @@
             <a:fld id="{A3D1AA53-AABD-6B49-992F-E061A7498157}" type="datetimeFigureOut">
               <a:rPr lang="en-US" smtClean="0"/>
               <a:pPr/>
-              <a:t>9/10/12</a:t>
+              <a:t>10/17/13</a:t>
             </a:fld>
             <a:endParaRPr lang="en-US"/>
           </a:p>
@@ -361,13 +360,18 @@
             <a:fld id="{5C6AEE8C-7E75-B34B-94B0-1167AF240711}" type="slidenum">
               <a:rPr lang="en-US" smtClean="0"/>
               <a:pPr/>
-              <a:t>‹#›</a:t>
+              <a:t>‹nr.›</a:t>
             </a:fld>
             <a:endParaRPr lang="en-US"/>
           </a:p>
         </p:txBody>
       </p:sp>
     </p:spTree>
+    <p:extLst>
+      <p:ext uri="{BB962C8B-B14F-4D97-AF65-F5344CB8AC3E}">
+        <p14:creationId xmlns:p14="http://schemas.microsoft.com/office/powerpoint/2010/main" val="580352185"/>
+      </p:ext>
+    </p:extLst>
   </p:cSld>
   <p:clrMap bg1="lt1" tx1="dk1" bg2="lt2" tx2="dk2" accent1="accent1" accent2="accent2" accent3="accent3" accent4="accent4" accent5="accent5" accent6="accent6" hlink="hlink" folHlink="folHlink"/>
   <p:notesStyle>
@@ -466,7 +470,7 @@
 </file>
 
 <file path=ppt/notesSlides/notesSlide1.xml><?xml version="1.0" encoding="utf-8"?>
-<p:notes xmlns:a="http://schemas.openxmlformats.org/drawingml/2006/main" xmlns:r="http://schemas.openxmlformats.org/officeDocument/2006/relationships" xmlns:mc="http://schemas.openxmlformats.org/markup-compatibility/2006" xmlns:mv="urn:schemas-microsoft-com:mac:vml" xmlns:p="http://schemas.openxmlformats.org/presentationml/2006/main" mc:Ignorable="mv" mc:PreserveAttributes="mv:*">
+<p:notes xmlns:a="http://schemas.openxmlformats.org/drawingml/2006/main" xmlns:r="http://schemas.openxmlformats.org/officeDocument/2006/relationships" xmlns:p="http://schemas.openxmlformats.org/presentationml/2006/main">
   <p:cSld>
     <p:spTree>
       <p:nvGrpSpPr>
@@ -556,7 +560,7 @@
 </file>
 
 <file path=ppt/slideLayouts/slideLayout1.xml><?xml version="1.0" encoding="utf-8"?>
-<p:sldLayout xmlns:a="http://schemas.openxmlformats.org/drawingml/2006/main" xmlns:r="http://schemas.openxmlformats.org/officeDocument/2006/relationships" xmlns:mc="http://schemas.openxmlformats.org/markup-compatibility/2006" xmlns:mv="urn:schemas-microsoft-com:mac:vml" xmlns:p="http://schemas.openxmlformats.org/presentationml/2006/main" mc:Ignorable="mv" mc:PreserveAttributes="mv:*" type="title" preserve="1">
+<p:sldLayout xmlns:a="http://schemas.openxmlformats.org/drawingml/2006/main" xmlns:r="http://schemas.openxmlformats.org/officeDocument/2006/relationships" xmlns:p="http://schemas.openxmlformats.org/presentationml/2006/main" type="title" preserve="1">
   <p:cSld name="Title Slide">
     <p:spTree>
       <p:nvGrpSpPr>
@@ -737,7 +741,7 @@
             <a:fld id="{653A51A6-7484-E546-BA42-A31390E7BDE5}" type="datetimeFigureOut">
               <a:rPr lang="en-US" smtClean="0"/>
               <a:pPr/>
-              <a:t>9/10/12</a:t>
+              <a:t>10/17/13</a:t>
             </a:fld>
             <a:endParaRPr lang="en-US"/>
           </a:p>
@@ -780,7 +784,7 @@
             <a:fld id="{2D7133BB-EB56-514D-BEB6-6BAC73E13192}" type="slidenum">
               <a:rPr lang="en-US" smtClean="0"/>
               <a:pPr/>
-              <a:t>‹#›</a:t>
+              <a:t>‹nr.›</a:t>
             </a:fld>
             <a:endParaRPr lang="en-US"/>
           </a:p>
@@ -795,7 +799,7 @@
 </file>
 
 <file path=ppt/slideLayouts/slideLayout10.xml><?xml version="1.0" encoding="utf-8"?>
-<p:sldLayout xmlns:a="http://schemas.openxmlformats.org/drawingml/2006/main" xmlns:r="http://schemas.openxmlformats.org/officeDocument/2006/relationships" xmlns:mc="http://schemas.openxmlformats.org/markup-compatibility/2006" xmlns:mv="urn:schemas-microsoft-com:mac:vml" xmlns:p="http://schemas.openxmlformats.org/presentationml/2006/main" mc:Ignorable="mv" mc:PreserveAttributes="mv:*" type="vertTx" preserve="1">
+<p:sldLayout xmlns:a="http://schemas.openxmlformats.org/drawingml/2006/main" xmlns:r="http://schemas.openxmlformats.org/officeDocument/2006/relationships" xmlns:p="http://schemas.openxmlformats.org/presentationml/2006/main" type="vertTx" preserve="1">
   <p:cSld name="Title and Vertical Text">
     <p:spTree>
       <p:nvGrpSpPr>
@@ -904,7 +908,7 @@
             <a:fld id="{653A51A6-7484-E546-BA42-A31390E7BDE5}" type="datetimeFigureOut">
               <a:rPr lang="en-US" smtClean="0"/>
               <a:pPr/>
-              <a:t>9/10/12</a:t>
+              <a:t>10/17/13</a:t>
             </a:fld>
             <a:endParaRPr lang="en-US"/>
           </a:p>
@@ -947,7 +951,7 @@
             <a:fld id="{2D7133BB-EB56-514D-BEB6-6BAC73E13192}" type="slidenum">
               <a:rPr lang="en-US" smtClean="0"/>
               <a:pPr/>
-              <a:t>‹#›</a:t>
+              <a:t>‹nr.›</a:t>
             </a:fld>
             <a:endParaRPr lang="en-US"/>
           </a:p>
@@ -962,7 +966,7 @@
 </file>
 
 <file path=ppt/slideLayouts/slideLayout11.xml><?xml version="1.0" encoding="utf-8"?>
-<p:sldLayout xmlns:a="http://schemas.openxmlformats.org/drawingml/2006/main" xmlns:r="http://schemas.openxmlformats.org/officeDocument/2006/relationships" xmlns:mc="http://schemas.openxmlformats.org/markup-compatibility/2006" xmlns:mv="urn:schemas-microsoft-com:mac:vml" xmlns:p="http://schemas.openxmlformats.org/presentationml/2006/main" mc:Ignorable="mv" mc:PreserveAttributes="mv:*" type="vertTitleAndTx" preserve="1">
+<p:sldLayout xmlns:a="http://schemas.openxmlformats.org/drawingml/2006/main" xmlns:r="http://schemas.openxmlformats.org/officeDocument/2006/relationships" xmlns:p="http://schemas.openxmlformats.org/presentationml/2006/main" type="vertTitleAndTx" preserve="1">
   <p:cSld name="Vertical Title and Text">
     <p:spTree>
       <p:nvGrpSpPr>
@@ -1081,7 +1085,7 @@
             <a:fld id="{653A51A6-7484-E546-BA42-A31390E7BDE5}" type="datetimeFigureOut">
               <a:rPr lang="en-US" smtClean="0"/>
               <a:pPr/>
-              <a:t>9/10/12</a:t>
+              <a:t>10/17/13</a:t>
             </a:fld>
             <a:endParaRPr lang="en-US"/>
           </a:p>
@@ -1124,7 +1128,7 @@
             <a:fld id="{2D7133BB-EB56-514D-BEB6-6BAC73E13192}" type="slidenum">
               <a:rPr lang="en-US" smtClean="0"/>
               <a:pPr/>
-              <a:t>‹#›</a:t>
+              <a:t>‹nr.›</a:t>
             </a:fld>
             <a:endParaRPr lang="en-US"/>
           </a:p>
@@ -1139,7 +1143,7 @@
 </file>
 
 <file path=ppt/slideLayouts/slideLayout2.xml><?xml version="1.0" encoding="utf-8"?>
-<p:sldLayout xmlns:a="http://schemas.openxmlformats.org/drawingml/2006/main" xmlns:r="http://schemas.openxmlformats.org/officeDocument/2006/relationships" xmlns:mc="http://schemas.openxmlformats.org/markup-compatibility/2006" xmlns:mv="urn:schemas-microsoft-com:mac:vml" xmlns:p="http://schemas.openxmlformats.org/presentationml/2006/main" mc:Ignorable="mv" mc:PreserveAttributes="mv:*" type="obj" preserve="1">
+<p:sldLayout xmlns:a="http://schemas.openxmlformats.org/drawingml/2006/main" xmlns:r="http://schemas.openxmlformats.org/officeDocument/2006/relationships" xmlns:p="http://schemas.openxmlformats.org/presentationml/2006/main" type="obj" preserve="1">
   <p:cSld name="Title and Content">
     <p:spTree>
       <p:nvGrpSpPr>
@@ -1248,7 +1252,7 @@
             <a:fld id="{653A51A6-7484-E546-BA42-A31390E7BDE5}" type="datetimeFigureOut">
               <a:rPr lang="en-US" smtClean="0"/>
               <a:pPr/>
-              <a:t>9/10/12</a:t>
+              <a:t>10/17/13</a:t>
             </a:fld>
             <a:endParaRPr lang="en-US"/>
           </a:p>
@@ -1291,7 +1295,7 @@
             <a:fld id="{2D7133BB-EB56-514D-BEB6-6BAC73E13192}" type="slidenum">
               <a:rPr lang="en-US" smtClean="0"/>
               <a:pPr/>
-              <a:t>‹#›</a:t>
+              <a:t>‹nr.›</a:t>
             </a:fld>
             <a:endParaRPr lang="en-US"/>
           </a:p>
@@ -1306,7 +1310,7 @@
 </file>
 
 <file path=ppt/slideLayouts/slideLayout3.xml><?xml version="1.0" encoding="utf-8"?>
-<p:sldLayout xmlns:a="http://schemas.openxmlformats.org/drawingml/2006/main" xmlns:r="http://schemas.openxmlformats.org/officeDocument/2006/relationships" xmlns:mc="http://schemas.openxmlformats.org/markup-compatibility/2006" xmlns:mv="urn:schemas-microsoft-com:mac:vml" xmlns:p="http://schemas.openxmlformats.org/presentationml/2006/main" mc:Ignorable="mv" mc:PreserveAttributes="mv:*" type="secHead" preserve="1">
+<p:sldLayout xmlns:a="http://schemas.openxmlformats.org/drawingml/2006/main" xmlns:r="http://schemas.openxmlformats.org/officeDocument/2006/relationships" xmlns:p="http://schemas.openxmlformats.org/presentationml/2006/main" type="secHead" preserve="1">
   <p:cSld name="Section Header">
     <p:spTree>
       <p:nvGrpSpPr>
@@ -1491,7 +1495,7 @@
             <a:fld id="{653A51A6-7484-E546-BA42-A31390E7BDE5}" type="datetimeFigureOut">
               <a:rPr lang="en-US" smtClean="0"/>
               <a:pPr/>
-              <a:t>9/10/12</a:t>
+              <a:t>10/17/13</a:t>
             </a:fld>
             <a:endParaRPr lang="en-US"/>
           </a:p>
@@ -1534,7 +1538,7 @@
             <a:fld id="{2D7133BB-EB56-514D-BEB6-6BAC73E13192}" type="slidenum">
               <a:rPr lang="en-US" smtClean="0"/>
               <a:pPr/>
-              <a:t>‹#›</a:t>
+              <a:t>‹nr.›</a:t>
             </a:fld>
             <a:endParaRPr lang="en-US"/>
           </a:p>
@@ -1549,7 +1553,7 @@
 </file>
 
 <file path=ppt/slideLayouts/slideLayout4.xml><?xml version="1.0" encoding="utf-8"?>
-<p:sldLayout xmlns:a="http://schemas.openxmlformats.org/drawingml/2006/main" xmlns:r="http://schemas.openxmlformats.org/officeDocument/2006/relationships" xmlns:mc="http://schemas.openxmlformats.org/markup-compatibility/2006" xmlns:mv="urn:schemas-microsoft-com:mac:vml" xmlns:p="http://schemas.openxmlformats.org/presentationml/2006/main" mc:Ignorable="mv" mc:PreserveAttributes="mv:*" type="twoObj" preserve="1">
+<p:sldLayout xmlns:a="http://schemas.openxmlformats.org/drawingml/2006/main" xmlns:r="http://schemas.openxmlformats.org/officeDocument/2006/relationships" xmlns:p="http://schemas.openxmlformats.org/presentationml/2006/main" type="twoObj" preserve="1">
   <p:cSld name="Two Content">
     <p:spTree>
       <p:nvGrpSpPr>
@@ -1776,7 +1780,7 @@
             <a:fld id="{653A51A6-7484-E546-BA42-A31390E7BDE5}" type="datetimeFigureOut">
               <a:rPr lang="en-US" smtClean="0"/>
               <a:pPr/>
-              <a:t>9/10/12</a:t>
+              <a:t>10/17/13</a:t>
             </a:fld>
             <a:endParaRPr lang="en-US"/>
           </a:p>
@@ -1819,7 +1823,7 @@
             <a:fld id="{2D7133BB-EB56-514D-BEB6-6BAC73E13192}" type="slidenum">
               <a:rPr lang="en-US" smtClean="0"/>
               <a:pPr/>
-              <a:t>‹#›</a:t>
+              <a:t>‹nr.›</a:t>
             </a:fld>
             <a:endParaRPr lang="en-US"/>
           </a:p>
@@ -1834,7 +1838,7 @@
 </file>
 
 <file path=ppt/slideLayouts/slideLayout5.xml><?xml version="1.0" encoding="utf-8"?>
-<p:sldLayout xmlns:a="http://schemas.openxmlformats.org/drawingml/2006/main" xmlns:r="http://schemas.openxmlformats.org/officeDocument/2006/relationships" xmlns:mc="http://schemas.openxmlformats.org/markup-compatibility/2006" xmlns:mv="urn:schemas-microsoft-com:mac:vml" xmlns:p="http://schemas.openxmlformats.org/presentationml/2006/main" mc:Ignorable="mv" mc:PreserveAttributes="mv:*" type="twoTxTwoObj" preserve="1">
+<p:sldLayout xmlns:a="http://schemas.openxmlformats.org/drawingml/2006/main" xmlns:r="http://schemas.openxmlformats.org/officeDocument/2006/relationships" xmlns:p="http://schemas.openxmlformats.org/presentationml/2006/main" type="twoTxTwoObj" preserve="1">
   <p:cSld name="Comparison">
     <p:spTree>
       <p:nvGrpSpPr>
@@ -2195,7 +2199,7 @@
             <a:fld id="{653A51A6-7484-E546-BA42-A31390E7BDE5}" type="datetimeFigureOut">
               <a:rPr lang="en-US" smtClean="0"/>
               <a:pPr/>
-              <a:t>9/10/12</a:t>
+              <a:t>10/17/13</a:t>
             </a:fld>
             <a:endParaRPr lang="en-US"/>
           </a:p>
@@ -2238,7 +2242,7 @@
             <a:fld id="{2D7133BB-EB56-514D-BEB6-6BAC73E13192}" type="slidenum">
               <a:rPr lang="en-US" smtClean="0"/>
               <a:pPr/>
-              <a:t>‹#›</a:t>
+              <a:t>‹nr.›</a:t>
             </a:fld>
             <a:endParaRPr lang="en-US"/>
           </a:p>
@@ -2253,7 +2257,7 @@
 </file>
 
 <file path=ppt/slideLayouts/slideLayout6.xml><?xml version="1.0" encoding="utf-8"?>
-<p:sldLayout xmlns:a="http://schemas.openxmlformats.org/drawingml/2006/main" xmlns:r="http://schemas.openxmlformats.org/officeDocument/2006/relationships" xmlns:mc="http://schemas.openxmlformats.org/markup-compatibility/2006" xmlns:mv="urn:schemas-microsoft-com:mac:vml" xmlns:p="http://schemas.openxmlformats.org/presentationml/2006/main" mc:Ignorable="mv" mc:PreserveAttributes="mv:*" type="titleOnly" preserve="1">
+<p:sldLayout xmlns:a="http://schemas.openxmlformats.org/drawingml/2006/main" xmlns:r="http://schemas.openxmlformats.org/officeDocument/2006/relationships" xmlns:p="http://schemas.openxmlformats.org/presentationml/2006/main" type="titleOnly" preserve="1">
   <p:cSld name="Title Only">
     <p:spTree>
       <p:nvGrpSpPr>
@@ -2310,7 +2314,7 @@
             <a:fld id="{653A51A6-7484-E546-BA42-A31390E7BDE5}" type="datetimeFigureOut">
               <a:rPr lang="en-US" smtClean="0"/>
               <a:pPr/>
-              <a:t>9/10/12</a:t>
+              <a:t>10/17/13</a:t>
             </a:fld>
             <a:endParaRPr lang="en-US"/>
           </a:p>
@@ -2353,7 +2357,7 @@
             <a:fld id="{2D7133BB-EB56-514D-BEB6-6BAC73E13192}" type="slidenum">
               <a:rPr lang="en-US" smtClean="0"/>
               <a:pPr/>
-              <a:t>‹#›</a:t>
+              <a:t>‹nr.›</a:t>
             </a:fld>
             <a:endParaRPr lang="en-US"/>
           </a:p>
@@ -2368,7 +2372,7 @@
 </file>
 
 <file path=ppt/slideLayouts/slideLayout7.xml><?xml version="1.0" encoding="utf-8"?>
-<p:sldLayout xmlns:a="http://schemas.openxmlformats.org/drawingml/2006/main" xmlns:r="http://schemas.openxmlformats.org/officeDocument/2006/relationships" xmlns:mc="http://schemas.openxmlformats.org/markup-compatibility/2006" xmlns:mv="urn:schemas-microsoft-com:mac:vml" xmlns:p="http://schemas.openxmlformats.org/presentationml/2006/main" mc:Ignorable="mv" mc:PreserveAttributes="mv:*" type="blank" preserve="1">
+<p:sldLayout xmlns:a="http://schemas.openxmlformats.org/drawingml/2006/main" xmlns:r="http://schemas.openxmlformats.org/officeDocument/2006/relationships" xmlns:p="http://schemas.openxmlformats.org/presentationml/2006/main" type="blank" preserve="1">
   <p:cSld name="Blank">
     <p:spTree>
       <p:nvGrpSpPr>
@@ -2402,7 +2406,7 @@
             <a:fld id="{653A51A6-7484-E546-BA42-A31390E7BDE5}" type="datetimeFigureOut">
               <a:rPr lang="en-US" smtClean="0"/>
               <a:pPr/>
-              <a:t>9/10/12</a:t>
+              <a:t>10/17/13</a:t>
             </a:fld>
             <a:endParaRPr lang="en-US"/>
           </a:p>
@@ -2445,7 +2449,7 @@
             <a:fld id="{2D7133BB-EB56-514D-BEB6-6BAC73E13192}" type="slidenum">
               <a:rPr lang="en-US" smtClean="0"/>
               <a:pPr/>
-              <a:t>‹#›</a:t>
+              <a:t>‹nr.›</a:t>
             </a:fld>
             <a:endParaRPr lang="en-US"/>
           </a:p>
@@ -2460,7 +2464,7 @@
 </file>
 
 <file path=ppt/slideLayouts/slideLayout8.xml><?xml version="1.0" encoding="utf-8"?>
-<p:sldLayout xmlns:a="http://schemas.openxmlformats.org/drawingml/2006/main" xmlns:r="http://schemas.openxmlformats.org/officeDocument/2006/relationships" xmlns:mc="http://schemas.openxmlformats.org/markup-compatibility/2006" xmlns:mv="urn:schemas-microsoft-com:mac:vml" xmlns:p="http://schemas.openxmlformats.org/presentationml/2006/main" mc:Ignorable="mv" mc:PreserveAttributes="mv:*" type="objTx" preserve="1">
+<p:sldLayout xmlns:a="http://schemas.openxmlformats.org/drawingml/2006/main" xmlns:r="http://schemas.openxmlformats.org/officeDocument/2006/relationships" xmlns:p="http://schemas.openxmlformats.org/presentationml/2006/main" type="objTx" preserve="1">
   <p:cSld name="Content with Caption">
     <p:spTree>
       <p:nvGrpSpPr>
@@ -2676,7 +2680,7 @@
             <a:fld id="{653A51A6-7484-E546-BA42-A31390E7BDE5}" type="datetimeFigureOut">
               <a:rPr lang="en-US" smtClean="0"/>
               <a:pPr/>
-              <a:t>9/10/12</a:t>
+              <a:t>10/17/13</a:t>
             </a:fld>
             <a:endParaRPr lang="en-US"/>
           </a:p>
@@ -2719,7 +2723,7 @@
             <a:fld id="{2D7133BB-EB56-514D-BEB6-6BAC73E13192}" type="slidenum">
               <a:rPr lang="en-US" smtClean="0"/>
               <a:pPr/>
-              <a:t>‹#›</a:t>
+              <a:t>‹nr.›</a:t>
             </a:fld>
             <a:endParaRPr lang="en-US"/>
           </a:p>
@@ -2734,7 +2738,7 @@
 </file>
 
 <file path=ppt/slideLayouts/slideLayout9.xml><?xml version="1.0" encoding="utf-8"?>
-<p:sldLayout xmlns:a="http://schemas.openxmlformats.org/drawingml/2006/main" xmlns:r="http://schemas.openxmlformats.org/officeDocument/2006/relationships" xmlns:mc="http://schemas.openxmlformats.org/markup-compatibility/2006" xmlns:mv="urn:schemas-microsoft-com:mac:vml" xmlns:p="http://schemas.openxmlformats.org/presentationml/2006/main" mc:Ignorable="mv" mc:PreserveAttributes="mv:*" type="picTx" preserve="1">
+<p:sldLayout xmlns:a="http://schemas.openxmlformats.org/drawingml/2006/main" xmlns:r="http://schemas.openxmlformats.org/officeDocument/2006/relationships" xmlns:p="http://schemas.openxmlformats.org/presentationml/2006/main" type="picTx" preserve="1">
   <p:cSld name="Picture with Caption">
     <p:spTree>
       <p:nvGrpSpPr>
@@ -2926,7 +2930,7 @@
             <a:fld id="{653A51A6-7484-E546-BA42-A31390E7BDE5}" type="datetimeFigureOut">
               <a:rPr lang="en-US" smtClean="0"/>
               <a:pPr/>
-              <a:t>9/10/12</a:t>
+              <a:t>10/17/13</a:t>
             </a:fld>
             <a:endParaRPr lang="en-US"/>
           </a:p>
@@ -2969,7 +2973,7 @@
             <a:fld id="{2D7133BB-EB56-514D-BEB6-6BAC73E13192}" type="slidenum">
               <a:rPr lang="en-US" smtClean="0"/>
               <a:pPr/>
-              <a:t>‹#›</a:t>
+              <a:t>‹nr.›</a:t>
             </a:fld>
             <a:endParaRPr lang="en-US"/>
           </a:p>
@@ -2984,7 +2988,7 @@
 </file>
 
 <file path=ppt/slideMasters/slideMaster1.xml><?xml version="1.0" encoding="utf-8"?>
-<p:sldMaster xmlns:a="http://schemas.openxmlformats.org/drawingml/2006/main" xmlns:r="http://schemas.openxmlformats.org/officeDocument/2006/relationships" xmlns:mc="http://schemas.openxmlformats.org/markup-compatibility/2006" xmlns:mv="urn:schemas-microsoft-com:mac:vml" xmlns:p="http://schemas.openxmlformats.org/presentationml/2006/main" mc:Ignorable="mv" mc:PreserveAttributes="mv:*">
+<p:sldMaster xmlns:a="http://schemas.openxmlformats.org/drawingml/2006/main" xmlns:r="http://schemas.openxmlformats.org/officeDocument/2006/relationships" xmlns:p="http://schemas.openxmlformats.org/presentationml/2006/main">
   <p:cSld>
     <p:bg>
       <p:bgRef idx="1001">
@@ -3136,7 +3140,7 @@
             <a:fld id="{653A51A6-7484-E546-BA42-A31390E7BDE5}" type="datetimeFigureOut">
               <a:rPr lang="en-US" smtClean="0"/>
               <a:pPr/>
-              <a:t>9/10/12</a:t>
+              <a:t>10/17/13</a:t>
             </a:fld>
             <a:endParaRPr lang="en-US"/>
           </a:p>
@@ -3215,7 +3219,7 @@
             <a:fld id="{2D7133BB-EB56-514D-BEB6-6BAC73E13192}" type="slidenum">
               <a:rPr lang="en-US" smtClean="0"/>
               <a:pPr/>
-              <a:t>‹#›</a:t>
+              <a:t>‹nr.›</a:t>
             </a:fld>
             <a:endParaRPr lang="en-US"/>
           </a:p>
@@ -3491,7 +3495,7 @@
 </file>
 
 <file path=ppt/slides/slide1.xml><?xml version="1.0" encoding="utf-8"?>
-<p:sld xmlns:a="http://schemas.openxmlformats.org/drawingml/2006/main" xmlns:r="http://schemas.openxmlformats.org/officeDocument/2006/relationships" xmlns:mc="http://schemas.openxmlformats.org/markup-compatibility/2006" xmlns:mv="urn:schemas-microsoft-com:mac:vml" xmlns:p="http://schemas.openxmlformats.org/presentationml/2006/main" mc:Ignorable="mv" mc:PreserveAttributes="mv:*">
+<p:sld xmlns:a="http://schemas.openxmlformats.org/drawingml/2006/main" xmlns:r="http://schemas.openxmlformats.org/officeDocument/2006/relationships" xmlns:p="http://schemas.openxmlformats.org/presentationml/2006/main">
   <p:cSld>
     <p:spTree>
       <p:nvGrpSpPr>
@@ -3545,14 +3549,6 @@
           <a:bodyPr/>
           <a:lstStyle/>
           <a:p>
-            <a:r>
-              <a:rPr lang="en-US" dirty="0" smtClean="0"/>
-              <a:t>12 September 2012</a:t>
-            </a:r>
-            <a:r>
-              <a:rPr lang="en-US" smtClean="0"/>
-              <a:t>, 14.30-18.00</a:t>
-            </a:r>
             <a:endParaRPr lang="en-US" dirty="0"/>
           </a:p>
         </p:txBody>
@@ -3565,7 +3561,7 @@
   <p:timing>
     <p:tnLst>
       <p:par>
-        <p:cTn id="1" dur="indefinite" restart="never" nodeType="tmRoot"/>
+        <p:cTn xmlns:p14="http://schemas.microsoft.com/office/powerpoint/2010/main" id="1" dur="indefinite" restart="never" nodeType="tmRoot"/>
       </p:par>
     </p:tnLst>
   </p:timing>
@@ -3573,7 +3569,7 @@
 </file>
 
 <file path=ppt/slides/slide2.xml><?xml version="1.0" encoding="utf-8"?>
-<p:sld xmlns:a="http://schemas.openxmlformats.org/drawingml/2006/main" xmlns:r="http://schemas.openxmlformats.org/officeDocument/2006/relationships" xmlns:mc="http://schemas.openxmlformats.org/markup-compatibility/2006" xmlns:mv="urn:schemas-microsoft-com:mac:vml" xmlns:p="http://schemas.openxmlformats.org/presentationml/2006/main" mc:Ignorable="mv" mc:PreserveAttributes="mv:*">
+<p:sld xmlns:a="http://schemas.openxmlformats.org/drawingml/2006/main" xmlns:r="http://schemas.openxmlformats.org/officeDocument/2006/relationships" xmlns:p="http://schemas.openxmlformats.org/presentationml/2006/main">
   <p:cSld>
     <p:spTree>
       <p:nvGrpSpPr>
@@ -3661,7 +3657,7 @@
   <p:timing>
     <p:tnLst>
       <p:par>
-        <p:cTn id="1" dur="indefinite" restart="never" nodeType="tmRoot"/>
+        <p:cTn xmlns:p14="http://schemas.microsoft.com/office/powerpoint/2010/main" id="1" dur="indefinite" restart="never" nodeType="tmRoot"/>
       </p:par>
     </p:tnLst>
   </p:timing>
@@ -3669,7 +3665,7 @@
 </file>
 
 <file path=ppt/slides/slide3.xml><?xml version="1.0" encoding="utf-8"?>
-<p:sld xmlns:a="http://schemas.openxmlformats.org/drawingml/2006/main" xmlns:r="http://schemas.openxmlformats.org/officeDocument/2006/relationships" xmlns:mc="http://schemas.openxmlformats.org/markup-compatibility/2006" xmlns:mv="urn:schemas-microsoft-com:mac:vml" xmlns:p="http://schemas.openxmlformats.org/presentationml/2006/main" mc:Ignorable="mv" mc:PreserveAttributes="mv:*">
+<p:sld xmlns:a="http://schemas.openxmlformats.org/drawingml/2006/main" xmlns:r="http://schemas.openxmlformats.org/officeDocument/2006/relationships" xmlns:p="http://schemas.openxmlformats.org/presentationml/2006/main">
   <p:cSld>
     <p:spTree>
       <p:nvGrpSpPr>
@@ -3750,7 +3746,7 @@
   <p:timing>
     <p:tnLst>
       <p:par>
-        <p:cTn id="1" dur="indefinite" restart="never" nodeType="tmRoot"/>
+        <p:cTn xmlns:p14="http://schemas.microsoft.com/office/powerpoint/2010/main" id="1" dur="indefinite" restart="never" nodeType="tmRoot"/>
       </p:par>
     </p:tnLst>
   </p:timing>
@@ -3758,7 +3754,7 @@
 </file>
 
 <file path=ppt/slides/slide4.xml><?xml version="1.0" encoding="utf-8"?>
-<p:sld xmlns:a="http://schemas.openxmlformats.org/drawingml/2006/main" xmlns:r="http://schemas.openxmlformats.org/officeDocument/2006/relationships" xmlns:mc="http://schemas.openxmlformats.org/markup-compatibility/2006" xmlns:mv="urn:schemas-microsoft-com:mac:vml" xmlns:p="http://schemas.openxmlformats.org/presentationml/2006/main" mc:Ignorable="mv" mc:PreserveAttributes="mv:*">
+<p:sld xmlns:a="http://schemas.openxmlformats.org/drawingml/2006/main" xmlns:r="http://schemas.openxmlformats.org/officeDocument/2006/relationships" xmlns:p="http://schemas.openxmlformats.org/presentationml/2006/main">
   <p:cSld>
     <p:spTree>
       <p:nvGrpSpPr>
@@ -3791,7 +3787,7 @@
           <a:p>
             <a:r>
               <a:rPr lang="en-US" dirty="0" smtClean="0"/>
-              <a:t>Project management</a:t>
+              <a:t>Project organization</a:t>
             </a:r>
             <a:endParaRPr lang="en-US" dirty="0"/>
           </a:p>
@@ -3809,10 +3805,72 @@
         </p:nvSpPr>
         <p:spPr/>
         <p:txBody>
-          <a:bodyPr/>
-          <a:lstStyle/>
-          <a:p>
-            <a:endParaRPr lang="en-US"/>
+          <a:bodyPr>
+            <a:normAutofit fontScale="92500" lnSpcReduction="20000"/>
+          </a:bodyPr>
+          <a:lstStyle/>
+          <a:p>
+            <a:r>
+              <a:rPr lang="en-US" dirty="0" smtClean="0"/>
+              <a:t>store all of the files relevant to one project under a common root directory</a:t>
+            </a:r>
+          </a:p>
+          <a:p>
+            <a:r>
+              <a:rPr lang="en-US" dirty="0" smtClean="0"/>
+              <a:t>logical top-level organization</a:t>
+            </a:r>
+          </a:p>
+          <a:p>
+            <a:pPr lvl="1"/>
+            <a:r>
+              <a:rPr lang="en-US" dirty="0" smtClean="0"/>
+              <a:t>doc</a:t>
+            </a:r>
+          </a:p>
+          <a:p>
+            <a:pPr lvl="1"/>
+            <a:r>
+              <a:rPr lang="en-US" dirty="0" smtClean="0"/>
+              <a:t>data</a:t>
+            </a:r>
+          </a:p>
+          <a:p>
+            <a:pPr lvl="1"/>
+            <a:r>
+              <a:rPr lang="en-US" dirty="0" err="1" smtClean="0"/>
+              <a:t>src</a:t>
+            </a:r>
+            <a:endParaRPr lang="en-US" dirty="0" smtClean="0"/>
+          </a:p>
+          <a:p>
+            <a:pPr lvl="1"/>
+            <a:r>
+              <a:rPr lang="en-US" dirty="0" smtClean="0"/>
+              <a:t>bin</a:t>
+            </a:r>
+          </a:p>
+          <a:p>
+            <a:pPr lvl="1"/>
+            <a:r>
+              <a:rPr lang="en-US" dirty="0" smtClean="0"/>
+              <a:t>results</a:t>
+            </a:r>
+          </a:p>
+          <a:p>
+            <a:r>
+              <a:rPr lang="en-US" dirty="0" smtClean="0"/>
+              <a:t>chronological Secondary organization</a:t>
+            </a:r>
+          </a:p>
+          <a:p>
+            <a:r>
+              <a:rPr lang="en-US" dirty="0" smtClean="0"/>
+              <a:t>logical tertiary organization</a:t>
+            </a:r>
+          </a:p>
+          <a:p>
+            <a:endParaRPr lang="en-US" dirty="0"/>
           </a:p>
         </p:txBody>
       </p:sp>
@@ -3825,136 +3883,7 @@
 </file>
 
 <file path=ppt/slides/slide5.xml><?xml version="1.0" encoding="utf-8"?>
-<p:sld xmlns:a="http://schemas.openxmlformats.org/drawingml/2006/main" xmlns:r="http://schemas.openxmlformats.org/officeDocument/2006/relationships" xmlns:mc="http://schemas.openxmlformats.org/markup-compatibility/2006" xmlns:mv="urn:schemas-microsoft-com:mac:vml" xmlns:p="http://schemas.openxmlformats.org/presentationml/2006/main" mc:Ignorable="mv" mc:PreserveAttributes="mv:*">
-  <p:cSld>
-    <p:spTree>
-      <p:nvGrpSpPr>
-        <p:cNvPr id="1" name=""/>
-        <p:cNvGrpSpPr/>
-        <p:nvPr/>
-      </p:nvGrpSpPr>
-      <p:grpSpPr>
-        <a:xfrm>
-          <a:off x="0" y="0"/>
-          <a:ext cx="0" cy="0"/>
-          <a:chOff x="0" y="0"/>
-          <a:chExt cx="0" cy="0"/>
-        </a:xfrm>
-      </p:grpSpPr>
-      <p:sp>
-        <p:nvSpPr>
-          <p:cNvPr id="2" name="Title 1"/>
-          <p:cNvSpPr>
-            <a:spLocks noGrp="1"/>
-          </p:cNvSpPr>
-          <p:nvPr>
-            <p:ph type="title"/>
-          </p:nvPr>
-        </p:nvSpPr>
-        <p:spPr/>
-        <p:txBody>
-          <a:bodyPr/>
-          <a:lstStyle/>
-          <a:p>
-            <a:r>
-              <a:rPr lang="en-US" dirty="0" smtClean="0"/>
-              <a:t>Project organization</a:t>
-            </a:r>
-            <a:endParaRPr lang="en-US" dirty="0"/>
-          </a:p>
-        </p:txBody>
-      </p:sp>
-      <p:sp>
-        <p:nvSpPr>
-          <p:cNvPr id="3" name="Content Placeholder 2"/>
-          <p:cNvSpPr>
-            <a:spLocks noGrp="1"/>
-          </p:cNvSpPr>
-          <p:nvPr>
-            <p:ph idx="1"/>
-          </p:nvPr>
-        </p:nvSpPr>
-        <p:spPr/>
-        <p:txBody>
-          <a:bodyPr>
-            <a:normAutofit fontScale="92500" lnSpcReduction="20000"/>
-          </a:bodyPr>
-          <a:lstStyle/>
-          <a:p>
-            <a:r>
-              <a:rPr lang="en-US" dirty="0" smtClean="0"/>
-              <a:t>store all of the files relevant to one project under a common root directory</a:t>
-            </a:r>
-          </a:p>
-          <a:p>
-            <a:r>
-              <a:rPr lang="en-US" dirty="0" smtClean="0"/>
-              <a:t>logical top-level organization</a:t>
-            </a:r>
-          </a:p>
-          <a:p>
-            <a:pPr lvl="1"/>
-            <a:r>
-              <a:rPr lang="en-US" dirty="0" smtClean="0"/>
-              <a:t>doc</a:t>
-            </a:r>
-          </a:p>
-          <a:p>
-            <a:pPr lvl="1"/>
-            <a:r>
-              <a:rPr lang="en-US" dirty="0" smtClean="0"/>
-              <a:t>data</a:t>
-            </a:r>
-          </a:p>
-          <a:p>
-            <a:pPr lvl="1"/>
-            <a:r>
-              <a:rPr lang="en-US" dirty="0" err="1" smtClean="0"/>
-              <a:t>src</a:t>
-            </a:r>
-            <a:endParaRPr lang="en-US" dirty="0" smtClean="0"/>
-          </a:p>
-          <a:p>
-            <a:pPr lvl="1"/>
-            <a:r>
-              <a:rPr lang="en-US" dirty="0" smtClean="0"/>
-              <a:t>bin</a:t>
-            </a:r>
-          </a:p>
-          <a:p>
-            <a:pPr lvl="1"/>
-            <a:r>
-              <a:rPr lang="en-US" dirty="0" smtClean="0"/>
-              <a:t>results</a:t>
-            </a:r>
-          </a:p>
-          <a:p>
-            <a:r>
-              <a:rPr lang="en-US" dirty="0" smtClean="0"/>
-              <a:t>chronological Secondary organization</a:t>
-            </a:r>
-          </a:p>
-          <a:p>
-            <a:r>
-              <a:rPr lang="en-US" dirty="0" smtClean="0"/>
-              <a:t>logical tertiary organization</a:t>
-            </a:r>
-          </a:p>
-          <a:p>
-            <a:endParaRPr lang="en-US" dirty="0"/>
-          </a:p>
-        </p:txBody>
-      </p:sp>
-    </p:spTree>
-  </p:cSld>
-  <p:clrMapOvr>
-    <a:masterClrMapping/>
-  </p:clrMapOvr>
-</p:sld>
-</file>
-
-<file path=ppt/slides/slide6.xml><?xml version="1.0" encoding="utf-8"?>
-<p:sld xmlns:a="http://schemas.openxmlformats.org/drawingml/2006/main" xmlns:r="http://schemas.openxmlformats.org/officeDocument/2006/relationships" xmlns:mc="http://schemas.openxmlformats.org/markup-compatibility/2006" xmlns:mv="urn:schemas-microsoft-com:mac:vml" xmlns:p="http://schemas.openxmlformats.org/presentationml/2006/main" mc:Ignorable="mv" mc:PreserveAttributes="mv:*">
+<p:sld xmlns:a="http://schemas.openxmlformats.org/drawingml/2006/main" xmlns:r="http://schemas.openxmlformats.org/officeDocument/2006/relationships" xmlns:p="http://schemas.openxmlformats.org/presentationml/2006/main">
   <p:cSld>
     <p:spTree>
       <p:nvGrpSpPr>
@@ -4056,8 +3985,8 @@
 </p:sld>
 </file>
 
-<file path=ppt/slides/slide7.xml><?xml version="1.0" encoding="utf-8"?>
-<p:sld xmlns:a="http://schemas.openxmlformats.org/drawingml/2006/main" xmlns:r="http://schemas.openxmlformats.org/officeDocument/2006/relationships" xmlns:mc="http://schemas.openxmlformats.org/markup-compatibility/2006" xmlns:mv="urn:schemas-microsoft-com:mac:vml" xmlns:p="http://schemas.openxmlformats.org/presentationml/2006/main" mc:Ignorable="mv" mc:PreserveAttributes="mv:*">
+<file path=ppt/slides/slide6.xml><?xml version="1.0" encoding="utf-8"?>
+<p:sld xmlns:a="http://schemas.openxmlformats.org/drawingml/2006/main" xmlns:r="http://schemas.openxmlformats.org/officeDocument/2006/relationships" xmlns:p="http://schemas.openxmlformats.org/presentationml/2006/main">
   <p:cSld>
     <p:spTree>
       <p:nvGrpSpPr>
@@ -4086,21 +4015,13 @@
         <p:spPr/>
         <p:txBody>
           <a:bodyPr>
-            <a:normAutofit fontScale="90000"/>
+            <a:normAutofit/>
           </a:bodyPr>
           <a:lstStyle/>
           <a:p>
             <a:r>
               <a:rPr lang="en-US" dirty="0" smtClean="0"/>
-              <a:t>Exercise: download and unzip </a:t>
-            </a:r>
-            <a:r>
-              <a:rPr lang="en-US" dirty="0" err="1" smtClean="0"/>
-              <a:t>git</a:t>
-            </a:r>
-            <a:r>
-              <a:rPr lang="en-US" dirty="0" smtClean="0"/>
-              <a:t> repo</a:t>
+              <a:t>Exercise</a:t>
             </a:r>
             <a:endParaRPr lang="en-US" dirty="0"/>
           </a:p>

</xml_diff>